<commit_message>
new GAIN notebook added
</commit_message>
<xml_diff>
--- a/workshop_05132020/FIREMAN_workshop.pptx
+++ b/workshop_05132020/FIREMAN_workshop.pptx
@@ -4597,6 +4597,84 @@
                 <a:sym typeface="Cousine"/>
               </a:rPr>
               <a:t>How it can be used in the context of FIREMAN?</a:t>
+            </a:r>
+          </a:p>
+          <a:p>
+            <a:pPr marL="171450" lvl="0" indent="-171450" algn="l" rtl="0">
+              <a:spcBef>
+                <a:spcPts val="600"/>
+              </a:spcBef>
+              <a:spcAft>
+                <a:spcPts val="0"/>
+              </a:spcAft>
+              <a:buClr>
+                <a:schemeClr val="bg1"/>
+              </a:buClr>
+              <a:buFontTx/>
+              <a:buChar char="-"/>
+            </a:pPr>
+            <a:r>
+              <a:rPr lang="en-US" sz="1800" b="1" dirty="0">
+                <a:solidFill>
+                  <a:srgbClr val="FFFFFF"/>
+                </a:solidFill>
+                <a:latin typeface="Cousine"/>
+                <a:ea typeface="Cousine"/>
+                <a:cs typeface="Cousine"/>
+                <a:sym typeface="Cousine"/>
+              </a:rPr>
+              <a:t>Establish a FIREMAN ML experiment tested</a:t>
+            </a:r>
+          </a:p>
+          <a:p>
+            <a:pPr marL="171450" lvl="0" indent="-171450" algn="l" rtl="0">
+              <a:spcBef>
+                <a:spcPts val="600"/>
+              </a:spcBef>
+              <a:spcAft>
+                <a:spcPts val="0"/>
+              </a:spcAft>
+              <a:buClr>
+                <a:schemeClr val="bg1"/>
+              </a:buClr>
+              <a:buFontTx/>
+              <a:buChar char="-"/>
+            </a:pPr>
+            <a:r>
+              <a:rPr lang="en-US" sz="1800" b="1" dirty="0">
+                <a:solidFill>
+                  <a:srgbClr val="FFFFFF"/>
+                </a:solidFill>
+                <a:latin typeface="Cousine"/>
+                <a:ea typeface="Cousine"/>
+                <a:cs typeface="Cousine"/>
+                <a:sym typeface="Cousine"/>
+              </a:rPr>
+              <a:t>Add new steps to pipeline </a:t>
+            </a:r>
+            <a:r>
+              <a:rPr lang="en-US" sz="1800" b="1" dirty="0" err="1">
+                <a:solidFill>
+                  <a:srgbClr val="FFFFFF"/>
+                </a:solidFill>
+                <a:latin typeface="Cousine"/>
+                <a:ea typeface="Cousine"/>
+                <a:cs typeface="Cousine"/>
+                <a:sym typeface="Cousine"/>
+              </a:rPr>
+              <a:t>etc</a:t>
+            </a:r>
+            <a:r>
+              <a:rPr lang="en-US" sz="1800" b="1" dirty="0">
+                <a:solidFill>
+                  <a:srgbClr val="FFFFFF"/>
+                </a:solidFill>
+                <a:latin typeface="Cousine"/>
+                <a:ea typeface="Cousine"/>
+                <a:cs typeface="Cousine"/>
+                <a:sym typeface="Cousine"/>
+              </a:rPr>
+              <a:t>…</a:t>
             </a:r>
             <a:endParaRPr sz="1800" dirty="0">
               <a:solidFill>
@@ -13670,7 +13748,7 @@
                 <a:latin typeface="Cousine" panose="020B0604020202020204" charset="0"/>
                 <a:cs typeface="Cousine" panose="020B0604020202020204" charset="0"/>
               </a:rPr>
-              <a:t>Discussion</a:t>
+              <a:t>Discussion topics</a:t>
             </a:r>
           </a:p>
         </p:txBody>
@@ -13690,7 +13768,7 @@
         <p:spPr>
           <a:xfrm>
             <a:off x="91440" y="1173081"/>
-            <a:ext cx="8961120" cy="3139321"/>
+            <a:ext cx="8961120" cy="3693319"/>
           </a:xfrm>
           <a:prstGeom prst="rect">
             <a:avLst/>
@@ -13938,7 +14016,45 @@
                 <a:latin typeface="Cousine" panose="020B0604020202020204" charset="0"/>
                 <a:cs typeface="Cousine" panose="020B0604020202020204" charset="0"/>
               </a:rPr>
+              <a:t>Deep learning approaches?</a:t>
+            </a:r>
+          </a:p>
+          <a:p>
+            <a:pPr marL="285750" indent="-285750">
+              <a:buClr>
+                <a:schemeClr val="bg1"/>
+              </a:buClr>
+              <a:buFontTx/>
+              <a:buChar char="-"/>
+            </a:pPr>
+            <a:r>
+              <a:rPr lang="en-US" sz="1800" dirty="0">
+                <a:solidFill>
+                  <a:schemeClr val="bg1"/>
+                </a:solidFill>
+                <a:latin typeface="Cousine" panose="020B0604020202020204" charset="0"/>
+                <a:cs typeface="Cousine" panose="020B0604020202020204" charset="0"/>
+              </a:rPr>
               <a:t>Influence of selected features on the results etc.</a:t>
+            </a:r>
+          </a:p>
+          <a:p>
+            <a:pPr marL="285750" indent="-285750">
+              <a:buClr>
+                <a:schemeClr val="bg1"/>
+              </a:buClr>
+              <a:buFontTx/>
+              <a:buChar char="-"/>
+            </a:pPr>
+            <a:r>
+              <a:rPr lang="en-US" sz="1800" dirty="0">
+                <a:solidFill>
+                  <a:schemeClr val="bg1"/>
+                </a:solidFill>
+                <a:latin typeface="Cousine" panose="020B0604020202020204" charset="0"/>
+                <a:cs typeface="Cousine" panose="020B0604020202020204" charset="0"/>
+              </a:rPr>
+              <a:t>…</a:t>
             </a:r>
           </a:p>
           <a:p>

</xml_diff>